<commit_message>
updated for final report submissino
</commit_message>
<xml_diff>
--- a/SNOMED-CT codes for Prior-Authorization.pptx
+++ b/SNOMED-CT codes for Prior-Authorization.pptx
@@ -1069,7 +1069,7 @@
           <a:p>
             <a:fld id="{87A2F627-9725-449D-86C9-C00A6BA0988B}" type="datetimeFigureOut">
               <a:rPr lang="en-US" smtClean="0"/>
-              <a:t>4/22/2024</a:t>
+              <a:t>4/23/2024</a:t>
             </a:fld>
             <a:endParaRPr lang="en-US"/>
           </a:p>
@@ -3693,7 +3693,7 @@
           <a:p>
             <a:fld id="{AA3C6D2E-1EC3-45C4-95B4-C569F6C2E280}" type="datetimeFigureOut">
               <a:rPr lang="en-US" smtClean="0"/>
-              <a:t>4/22/2024</a:t>
+              <a:t>4/23/2024</a:t>
             </a:fld>
             <a:endParaRPr lang="en-US"/>
           </a:p>
@@ -3891,7 +3891,7 @@
           <a:p>
             <a:fld id="{AA3C6D2E-1EC3-45C4-95B4-C569F6C2E280}" type="datetimeFigureOut">
               <a:rPr lang="en-US" smtClean="0"/>
-              <a:t>4/22/2024</a:t>
+              <a:t>4/23/2024</a:t>
             </a:fld>
             <a:endParaRPr lang="en-US"/>
           </a:p>
@@ -4099,7 +4099,7 @@
           <a:p>
             <a:fld id="{AA3C6D2E-1EC3-45C4-95B4-C569F6C2E280}" type="datetimeFigureOut">
               <a:rPr lang="en-US" smtClean="0"/>
-              <a:t>4/22/2024</a:t>
+              <a:t>4/23/2024</a:t>
             </a:fld>
             <a:endParaRPr lang="en-US"/>
           </a:p>
@@ -4297,7 +4297,7 @@
           <a:p>
             <a:fld id="{AA3C6D2E-1EC3-45C4-95B4-C569F6C2E280}" type="datetimeFigureOut">
               <a:rPr lang="en-US" smtClean="0"/>
-              <a:t>4/22/2024</a:t>
+              <a:t>4/23/2024</a:t>
             </a:fld>
             <a:endParaRPr lang="en-US"/>
           </a:p>
@@ -4572,7 +4572,7 @@
           <a:p>
             <a:fld id="{AA3C6D2E-1EC3-45C4-95B4-C569F6C2E280}" type="datetimeFigureOut">
               <a:rPr lang="en-US" smtClean="0"/>
-              <a:t>4/22/2024</a:t>
+              <a:t>4/23/2024</a:t>
             </a:fld>
             <a:endParaRPr lang="en-US"/>
           </a:p>
@@ -4837,7 +4837,7 @@
           <a:p>
             <a:fld id="{AA3C6D2E-1EC3-45C4-95B4-C569F6C2E280}" type="datetimeFigureOut">
               <a:rPr lang="en-US" smtClean="0"/>
-              <a:t>4/22/2024</a:t>
+              <a:t>4/23/2024</a:t>
             </a:fld>
             <a:endParaRPr lang="en-US"/>
           </a:p>
@@ -5249,7 +5249,7 @@
           <a:p>
             <a:fld id="{AA3C6D2E-1EC3-45C4-95B4-C569F6C2E280}" type="datetimeFigureOut">
               <a:rPr lang="en-US" smtClean="0"/>
-              <a:t>4/22/2024</a:t>
+              <a:t>4/23/2024</a:t>
             </a:fld>
             <a:endParaRPr lang="en-US"/>
           </a:p>
@@ -5390,7 +5390,7 @@
           <a:p>
             <a:fld id="{AA3C6D2E-1EC3-45C4-95B4-C569F6C2E280}" type="datetimeFigureOut">
               <a:rPr lang="en-US" smtClean="0"/>
-              <a:t>4/22/2024</a:t>
+              <a:t>4/23/2024</a:t>
             </a:fld>
             <a:endParaRPr lang="en-US"/>
           </a:p>
@@ -5503,7 +5503,7 @@
           <a:p>
             <a:fld id="{AA3C6D2E-1EC3-45C4-95B4-C569F6C2E280}" type="datetimeFigureOut">
               <a:rPr lang="en-US" smtClean="0"/>
-              <a:t>4/22/2024</a:t>
+              <a:t>4/23/2024</a:t>
             </a:fld>
             <a:endParaRPr lang="en-US"/>
           </a:p>
@@ -5814,7 +5814,7 @@
           <a:p>
             <a:fld id="{AA3C6D2E-1EC3-45C4-95B4-C569F6C2E280}" type="datetimeFigureOut">
               <a:rPr lang="en-US" smtClean="0"/>
-              <a:t>4/22/2024</a:t>
+              <a:t>4/23/2024</a:t>
             </a:fld>
             <a:endParaRPr lang="en-US"/>
           </a:p>
@@ -6102,7 +6102,7 @@
           <a:p>
             <a:fld id="{AA3C6D2E-1EC3-45C4-95B4-C569F6C2E280}" type="datetimeFigureOut">
               <a:rPr lang="en-US" smtClean="0"/>
-              <a:t>4/22/2024</a:t>
+              <a:t>4/23/2024</a:t>
             </a:fld>
             <a:endParaRPr lang="en-US"/>
           </a:p>
@@ -6343,7 +6343,7 @@
           <a:p>
             <a:fld id="{AA3C6D2E-1EC3-45C4-95B4-C569F6C2E280}" type="datetimeFigureOut">
               <a:rPr lang="en-US" smtClean="0"/>
-              <a:t>4/22/2024</a:t>
+              <a:t>4/23/2024</a:t>
             </a:fld>
             <a:endParaRPr lang="en-US"/>
           </a:p>
@@ -6860,238 +6860,6 @@
       </p:grpSpPr>
       <p:sp>
         <p:nvSpPr>
-          <p:cNvPr id="11" name="TextBox 10">
-            <a:extLst>
-              <a:ext uri="{FF2B5EF4-FFF2-40B4-BE49-F238E27FC236}">
-                <a16:creationId xmlns:a16="http://schemas.microsoft.com/office/drawing/2014/main" id="{81ED2068-6525-5B6A-F5BD-8FE01E47FAD9}"/>
-              </a:ext>
-            </a:extLst>
-          </p:cNvPr>
-          <p:cNvSpPr txBox="1"/>
-          <p:nvPr/>
-        </p:nvSpPr>
-        <p:spPr>
-          <a:xfrm>
-            <a:off x="6337300" y="1261955"/>
-            <a:ext cx="5588000" cy="4524315"/>
-          </a:xfrm>
-          <a:prstGeom prst="rect">
-            <a:avLst/>
-          </a:prstGeom>
-          <a:noFill/>
-        </p:spPr>
-        <p:txBody>
-          <a:bodyPr wrap="square" rtlCol="0">
-            <a:spAutoFit/>
-          </a:bodyPr>
-          <a:lstStyle/>
-          <a:p>
-            <a:pPr marL="285750" indent="-285750">
-              <a:buFont typeface="Arial" panose="020B0604020202020204" pitchFamily="34" charset="0"/>
-              <a:buChar char="•"/>
-            </a:pPr>
-            <a:r>
-              <a:rPr lang="en-US" dirty="0"/>
-              <a:t>3 aggregation methods tested</a:t>
-            </a:r>
-          </a:p>
-          <a:p>
-            <a:pPr marL="742950" lvl="1" indent="-285750">
-              <a:buFont typeface="Arial" panose="020B0604020202020204" pitchFamily="34" charset="0"/>
-              <a:buChar char="•"/>
-            </a:pPr>
-            <a:r>
-              <a:rPr lang="en-US" dirty="0"/>
-              <a:t>Logits mean </a:t>
-            </a:r>
-            <a:r>
-              <a:rPr lang="en-US" dirty="0" err="1"/>
-              <a:t>agg</a:t>
-            </a:r>
-            <a:endParaRPr lang="en-US" dirty="0"/>
-          </a:p>
-          <a:p>
-            <a:pPr marL="742950" lvl="1" indent="-285750">
-              <a:buFont typeface="Arial" panose="020B0604020202020204" pitchFamily="34" charset="0"/>
-              <a:buChar char="•"/>
-            </a:pPr>
-            <a:r>
-              <a:rPr lang="en-US" dirty="0"/>
-              <a:t>Logits max </a:t>
-            </a:r>
-            <a:r>
-              <a:rPr lang="en-US" dirty="0" err="1"/>
-              <a:t>agg</a:t>
-            </a:r>
-            <a:endParaRPr lang="en-US" dirty="0"/>
-          </a:p>
-          <a:p>
-            <a:pPr marL="742950" lvl="1" indent="-285750">
-              <a:buFont typeface="Arial" panose="020B0604020202020204" pitchFamily="34" charset="0"/>
-              <a:buChar char="•"/>
-            </a:pPr>
-            <a:r>
-              <a:rPr lang="en-US" dirty="0"/>
-              <a:t>Sequence mean </a:t>
-            </a:r>
-            <a:r>
-              <a:rPr lang="en-US" dirty="0" err="1"/>
-              <a:t>agg</a:t>
-            </a:r>
-            <a:endParaRPr lang="en-US" dirty="0"/>
-          </a:p>
-          <a:p>
-            <a:pPr marL="285750" indent="-285750">
-              <a:buFont typeface="Arial" panose="020B0604020202020204" pitchFamily="34" charset="0"/>
-              <a:buChar char="•"/>
-            </a:pPr>
-            <a:endParaRPr lang="en-US" dirty="0"/>
-          </a:p>
-          <a:p>
-            <a:pPr marL="285750" indent="-285750">
-              <a:buFont typeface="Arial" panose="020B0604020202020204" pitchFamily="34" charset="0"/>
-              <a:buChar char="•"/>
-            </a:pPr>
-            <a:r>
-              <a:rPr lang="en-US" dirty="0"/>
-              <a:t>3 FC layers (128, 128 1)</a:t>
-            </a:r>
-          </a:p>
-          <a:p>
-            <a:pPr marL="285750" indent="-285750">
-              <a:buFont typeface="Arial" panose="020B0604020202020204" pitchFamily="34" charset="0"/>
-              <a:buChar char="•"/>
-            </a:pPr>
-            <a:r>
-              <a:rPr lang="en-US" dirty="0" err="1"/>
-              <a:t>BCEWithLogitsLoss</a:t>
-            </a:r>
-            <a:endParaRPr lang="en-US" dirty="0"/>
-          </a:p>
-          <a:p>
-            <a:pPr marL="285750" indent="-285750">
-              <a:buFont typeface="Arial" panose="020B0604020202020204" pitchFamily="34" charset="0"/>
-              <a:buChar char="•"/>
-            </a:pPr>
-            <a:r>
-              <a:rPr lang="en-US" dirty="0" err="1"/>
-              <a:t>ReLU</a:t>
-            </a:r>
-            <a:r>
-              <a:rPr lang="en-US" dirty="0"/>
-              <a:t> activation</a:t>
-            </a:r>
-          </a:p>
-          <a:p>
-            <a:pPr marL="285750" indent="-285750">
-              <a:buFont typeface="Arial" panose="020B0604020202020204" pitchFamily="34" charset="0"/>
-              <a:buChar char="•"/>
-            </a:pPr>
-            <a:r>
-              <a:rPr lang="en-US" dirty="0"/>
-              <a:t>Adam Optimizer, </a:t>
-            </a:r>
-            <a:r>
-              <a:rPr lang="en-US" dirty="0" err="1"/>
-              <a:t>lr</a:t>
-            </a:r>
-            <a:r>
-              <a:rPr lang="en-US" dirty="0"/>
-              <a:t>=0.001</a:t>
-            </a:r>
-          </a:p>
-          <a:p>
-            <a:pPr marL="285750" indent="-285750">
-              <a:buFont typeface="Arial" panose="020B0604020202020204" pitchFamily="34" charset="0"/>
-              <a:buChar char="•"/>
-            </a:pPr>
-            <a:r>
-              <a:rPr lang="en-US" dirty="0"/>
-              <a:t>BS=30</a:t>
-            </a:r>
-          </a:p>
-          <a:p>
-            <a:pPr marL="285750" indent="-285750">
-              <a:buFont typeface="Arial" panose="020B0604020202020204" pitchFamily="34" charset="0"/>
-              <a:buChar char="•"/>
-            </a:pPr>
-            <a:endParaRPr lang="en-US" dirty="0"/>
-          </a:p>
-          <a:p>
-            <a:pPr marL="285750" indent="-285750">
-              <a:buFont typeface="Arial" panose="020B0604020202020204" pitchFamily="34" charset="0"/>
-              <a:buChar char="•"/>
-            </a:pPr>
-            <a:r>
-              <a:rPr lang="en-US" dirty="0"/>
-              <a:t>Final Testing F1 Score:</a:t>
-            </a:r>
-          </a:p>
-          <a:p>
-            <a:pPr marL="742950" lvl="1" indent="-285750">
-              <a:buFont typeface="Arial" panose="020B0604020202020204" pitchFamily="34" charset="0"/>
-              <a:buChar char="•"/>
-            </a:pPr>
-            <a:r>
-              <a:rPr lang="en-US" dirty="0"/>
-              <a:t>Mean Seq </a:t>
-            </a:r>
-            <a:r>
-              <a:rPr lang="en-US" dirty="0" err="1"/>
-              <a:t>agg</a:t>
-            </a:r>
-            <a:r>
-              <a:rPr lang="en-US" dirty="0"/>
-              <a:t>: 0.862</a:t>
-            </a:r>
-          </a:p>
-          <a:p>
-            <a:pPr marL="742950" lvl="1" indent="-285750">
-              <a:buFont typeface="Arial" panose="020B0604020202020204" pitchFamily="34" charset="0"/>
-              <a:buChar char="•"/>
-            </a:pPr>
-            <a:r>
-              <a:rPr lang="en-US" dirty="0"/>
-              <a:t>Mean Logits </a:t>
-            </a:r>
-            <a:r>
-              <a:rPr lang="en-US" dirty="0" err="1"/>
-              <a:t>agg</a:t>
-            </a:r>
-            <a:r>
-              <a:rPr lang="en-US" dirty="0"/>
-              <a:t>: 0.988</a:t>
-            </a:r>
-          </a:p>
-          <a:p>
-            <a:pPr marL="742950" lvl="1" indent="-285750">
-              <a:buFont typeface="Arial" panose="020B0604020202020204" pitchFamily="34" charset="0"/>
-              <a:buChar char="•"/>
-            </a:pPr>
-            <a:r>
-              <a:rPr lang="en-US" dirty="0"/>
-              <a:t>Max Logits </a:t>
-            </a:r>
-            <a:r>
-              <a:rPr lang="en-US" dirty="0" err="1"/>
-              <a:t>agg</a:t>
-            </a:r>
-            <a:r>
-              <a:rPr lang="en-US" dirty="0"/>
-              <a:t>: 1.0</a:t>
-            </a:r>
-          </a:p>
-          <a:p>
-            <a:pPr marL="285750" indent="-285750">
-              <a:buFont typeface="Arial" panose="020B0604020202020204" pitchFamily="34" charset="0"/>
-              <a:buChar char="•"/>
-            </a:pPr>
-            <a:endParaRPr lang="en-US" dirty="0"/>
-          </a:p>
-        </p:txBody>
-      </p:sp>
-      <p:sp>
-        <p:nvSpPr>
           <p:cNvPr id="2" name="Title 1">
             <a:extLst>
               <a:ext uri="{FF2B5EF4-FFF2-40B4-BE49-F238E27FC236}">
@@ -7351,6 +7119,238 @@
           </a:prstGeom>
         </p:spPr>
       </p:pic>
+      <p:sp>
+        <p:nvSpPr>
+          <p:cNvPr id="11" name="TextBox 10">
+            <a:extLst>
+              <a:ext uri="{FF2B5EF4-FFF2-40B4-BE49-F238E27FC236}">
+                <a16:creationId xmlns:a16="http://schemas.microsoft.com/office/drawing/2014/main" id="{81ED2068-6525-5B6A-F5BD-8FE01E47FAD9}"/>
+              </a:ext>
+            </a:extLst>
+          </p:cNvPr>
+          <p:cNvSpPr txBox="1"/>
+          <p:nvPr/>
+        </p:nvSpPr>
+        <p:spPr>
+          <a:xfrm>
+            <a:off x="6337300" y="1261955"/>
+            <a:ext cx="5588000" cy="4524315"/>
+          </a:xfrm>
+          <a:prstGeom prst="rect">
+            <a:avLst/>
+          </a:prstGeom>
+          <a:noFill/>
+        </p:spPr>
+        <p:txBody>
+          <a:bodyPr wrap="square" rtlCol="0">
+            <a:spAutoFit/>
+          </a:bodyPr>
+          <a:lstStyle/>
+          <a:p>
+            <a:pPr marL="285750" indent="-285750">
+              <a:buFont typeface="Arial" panose="020B0604020202020204" pitchFamily="34" charset="0"/>
+              <a:buChar char="•"/>
+            </a:pPr>
+            <a:r>
+              <a:rPr lang="en-US" dirty="0"/>
+              <a:t>3 aggregation methods tested</a:t>
+            </a:r>
+          </a:p>
+          <a:p>
+            <a:pPr marL="742950" lvl="1" indent="-285750">
+              <a:buFont typeface="Arial" panose="020B0604020202020204" pitchFamily="34" charset="0"/>
+              <a:buChar char="•"/>
+            </a:pPr>
+            <a:r>
+              <a:rPr lang="en-US" dirty="0"/>
+              <a:t>Logits mean </a:t>
+            </a:r>
+            <a:r>
+              <a:rPr lang="en-US" dirty="0" err="1"/>
+              <a:t>agg</a:t>
+            </a:r>
+            <a:endParaRPr lang="en-US" dirty="0"/>
+          </a:p>
+          <a:p>
+            <a:pPr marL="742950" lvl="1" indent="-285750">
+              <a:buFont typeface="Arial" panose="020B0604020202020204" pitchFamily="34" charset="0"/>
+              <a:buChar char="•"/>
+            </a:pPr>
+            <a:r>
+              <a:rPr lang="en-US" dirty="0"/>
+              <a:t>Logits max </a:t>
+            </a:r>
+            <a:r>
+              <a:rPr lang="en-US" dirty="0" err="1"/>
+              <a:t>agg</a:t>
+            </a:r>
+            <a:endParaRPr lang="en-US" dirty="0"/>
+          </a:p>
+          <a:p>
+            <a:pPr marL="742950" lvl="1" indent="-285750">
+              <a:buFont typeface="Arial" panose="020B0604020202020204" pitchFamily="34" charset="0"/>
+              <a:buChar char="•"/>
+            </a:pPr>
+            <a:r>
+              <a:rPr lang="en-US" dirty="0"/>
+              <a:t>Sequence mean </a:t>
+            </a:r>
+            <a:r>
+              <a:rPr lang="en-US" dirty="0" err="1"/>
+              <a:t>agg</a:t>
+            </a:r>
+            <a:endParaRPr lang="en-US" dirty="0"/>
+          </a:p>
+          <a:p>
+            <a:pPr marL="285750" indent="-285750">
+              <a:buFont typeface="Arial" panose="020B0604020202020204" pitchFamily="34" charset="0"/>
+              <a:buChar char="•"/>
+            </a:pPr>
+            <a:endParaRPr lang="en-US" dirty="0"/>
+          </a:p>
+          <a:p>
+            <a:pPr marL="285750" indent="-285750">
+              <a:buFont typeface="Arial" panose="020B0604020202020204" pitchFamily="34" charset="0"/>
+              <a:buChar char="•"/>
+            </a:pPr>
+            <a:r>
+              <a:rPr lang="en-US" dirty="0"/>
+              <a:t>3 FC layers (128, 128 1)</a:t>
+            </a:r>
+          </a:p>
+          <a:p>
+            <a:pPr marL="285750" indent="-285750">
+              <a:buFont typeface="Arial" panose="020B0604020202020204" pitchFamily="34" charset="0"/>
+              <a:buChar char="•"/>
+            </a:pPr>
+            <a:r>
+              <a:rPr lang="en-US" dirty="0" err="1"/>
+              <a:t>BCEWithLogitsLoss</a:t>
+            </a:r>
+            <a:endParaRPr lang="en-US" dirty="0"/>
+          </a:p>
+          <a:p>
+            <a:pPr marL="285750" indent="-285750">
+              <a:buFont typeface="Arial" panose="020B0604020202020204" pitchFamily="34" charset="0"/>
+              <a:buChar char="•"/>
+            </a:pPr>
+            <a:r>
+              <a:rPr lang="en-US" dirty="0" err="1"/>
+              <a:t>ReLU</a:t>
+            </a:r>
+            <a:r>
+              <a:rPr lang="en-US" dirty="0"/>
+              <a:t> activation</a:t>
+            </a:r>
+          </a:p>
+          <a:p>
+            <a:pPr marL="285750" indent="-285750">
+              <a:buFont typeface="Arial" panose="020B0604020202020204" pitchFamily="34" charset="0"/>
+              <a:buChar char="•"/>
+            </a:pPr>
+            <a:r>
+              <a:rPr lang="en-US" dirty="0"/>
+              <a:t>Adam Optimizer, </a:t>
+            </a:r>
+            <a:r>
+              <a:rPr lang="en-US" dirty="0" err="1"/>
+              <a:t>lr</a:t>
+            </a:r>
+            <a:r>
+              <a:rPr lang="en-US" dirty="0"/>
+              <a:t>=0.001</a:t>
+            </a:r>
+          </a:p>
+          <a:p>
+            <a:pPr marL="285750" indent="-285750">
+              <a:buFont typeface="Arial" panose="020B0604020202020204" pitchFamily="34" charset="0"/>
+              <a:buChar char="•"/>
+            </a:pPr>
+            <a:r>
+              <a:rPr lang="en-US" dirty="0"/>
+              <a:t>BS=30</a:t>
+            </a:r>
+          </a:p>
+          <a:p>
+            <a:pPr marL="285750" indent="-285750">
+              <a:buFont typeface="Arial" panose="020B0604020202020204" pitchFamily="34" charset="0"/>
+              <a:buChar char="•"/>
+            </a:pPr>
+            <a:endParaRPr lang="en-US" dirty="0"/>
+          </a:p>
+          <a:p>
+            <a:pPr marL="285750" indent="-285750">
+              <a:buFont typeface="Arial" panose="020B0604020202020204" pitchFamily="34" charset="0"/>
+              <a:buChar char="•"/>
+            </a:pPr>
+            <a:r>
+              <a:rPr lang="en-US" dirty="0"/>
+              <a:t>Final Testing F1 Score:</a:t>
+            </a:r>
+          </a:p>
+          <a:p>
+            <a:pPr marL="742950" lvl="1" indent="-285750">
+              <a:buFont typeface="Arial" panose="020B0604020202020204" pitchFamily="34" charset="0"/>
+              <a:buChar char="•"/>
+            </a:pPr>
+            <a:r>
+              <a:rPr lang="en-US" dirty="0"/>
+              <a:t>Mean Seq </a:t>
+            </a:r>
+            <a:r>
+              <a:rPr lang="en-US" dirty="0" err="1"/>
+              <a:t>agg</a:t>
+            </a:r>
+            <a:r>
+              <a:rPr lang="en-US" dirty="0"/>
+              <a:t>: 0.862</a:t>
+            </a:r>
+          </a:p>
+          <a:p>
+            <a:pPr marL="742950" lvl="1" indent="-285750">
+              <a:buFont typeface="Arial" panose="020B0604020202020204" pitchFamily="34" charset="0"/>
+              <a:buChar char="•"/>
+            </a:pPr>
+            <a:r>
+              <a:rPr lang="en-US" dirty="0"/>
+              <a:t>Mean Logits </a:t>
+            </a:r>
+            <a:r>
+              <a:rPr lang="en-US" dirty="0" err="1"/>
+              <a:t>agg</a:t>
+            </a:r>
+            <a:r>
+              <a:rPr lang="en-US" dirty="0"/>
+              <a:t>: 0.988</a:t>
+            </a:r>
+          </a:p>
+          <a:p>
+            <a:pPr marL="742950" lvl="1" indent="-285750">
+              <a:buFont typeface="Arial" panose="020B0604020202020204" pitchFamily="34" charset="0"/>
+              <a:buChar char="•"/>
+            </a:pPr>
+            <a:r>
+              <a:rPr lang="en-US" dirty="0"/>
+              <a:t>Max Logits </a:t>
+            </a:r>
+            <a:r>
+              <a:rPr lang="en-US" dirty="0" err="1"/>
+              <a:t>agg</a:t>
+            </a:r>
+            <a:r>
+              <a:rPr lang="en-US" dirty="0"/>
+              <a:t>: 1.0</a:t>
+            </a:r>
+          </a:p>
+          <a:p>
+            <a:pPr marL="285750" indent="-285750">
+              <a:buFont typeface="Arial" panose="020B0604020202020204" pitchFamily="34" charset="0"/>
+              <a:buChar char="•"/>
+            </a:pPr>
+            <a:endParaRPr lang="en-US" dirty="0"/>
+          </a:p>
+        </p:txBody>
+      </p:sp>
     </p:spTree>
     <p:extLst>
       <p:ext uri="{BB962C8B-B14F-4D97-AF65-F5344CB8AC3E}">

</xml_diff>